<commit_message>
Updated the ppt and add feature of authentication
</commit_message>
<xml_diff>
--- a/finalproject.pptx
+++ b/finalproject.pptx
@@ -17,22 +17,22 @@
   <p:notesSz cx="6858000" cy="9144000"/>
   <p:embeddedFontLst>
     <p:embeddedFont>
-      <p:font typeface="Quicksand Bold" panose="020B0604020202020204" charset="0"/>
+      <p:font typeface="Quicksand" panose="020B0604020202020204" charset="0"/>
       <p:regular r:id="rId9"/>
     </p:embeddedFont>
     <p:embeddedFont>
+      <p:font typeface="Quicksand Bold" panose="020B0604020202020204" charset="0"/>
+      <p:regular r:id="rId10"/>
+    </p:embeddedFont>
+    <p:embeddedFont>
       <p:font typeface="Calibri" panose="020F0502020204030204" pitchFamily="34" charset="0"/>
-      <p:regular r:id="rId10"/>
-      <p:bold r:id="rId11"/>
-      <p:italic r:id="rId12"/>
-      <p:boldItalic r:id="rId13"/>
+      <p:regular r:id="rId11"/>
+      <p:bold r:id="rId12"/>
+      <p:italic r:id="rId13"/>
+      <p:boldItalic r:id="rId14"/>
     </p:embeddedFont>
     <p:embeddedFont>
       <p:font typeface="Cormorant Garamond Bold Italics" panose="020B0604020202020204" charset="0"/>
-      <p:regular r:id="rId14"/>
-    </p:embeddedFont>
-    <p:embeddedFont>
-      <p:font typeface="Quicksand" panose="020B0604020202020204" charset="0"/>
       <p:regular r:id="rId15"/>
     </p:embeddedFont>
   </p:embeddedFontLst>
@@ -332,7 +332,7 @@
             <a:fld id="{1D8BD707-D9CF-40AE-B4C6-C98DA3205C09}" type="datetimeFigureOut">
               <a:rPr lang="en-US" smtClean="0"/>
               <a:pPr/>
-              <a:t>1/27/2025</a:t>
+              <a:t>1/29/25</a:t>
             </a:fld>
             <a:endParaRPr lang="en-US"/>
           </a:p>
@@ -499,7 +499,7 @@
             <a:fld id="{1D8BD707-D9CF-40AE-B4C6-C98DA3205C09}" type="datetimeFigureOut">
               <a:rPr lang="en-US" smtClean="0"/>
               <a:pPr/>
-              <a:t>1/27/2025</a:t>
+              <a:t>1/29/25</a:t>
             </a:fld>
             <a:endParaRPr lang="en-US"/>
           </a:p>
@@ -676,7 +676,7 @@
             <a:fld id="{1D8BD707-D9CF-40AE-B4C6-C98DA3205C09}" type="datetimeFigureOut">
               <a:rPr lang="en-US" smtClean="0"/>
               <a:pPr/>
-              <a:t>1/27/2025</a:t>
+              <a:t>1/29/25</a:t>
             </a:fld>
             <a:endParaRPr lang="en-US"/>
           </a:p>
@@ -843,7 +843,7 @@
             <a:fld id="{1D8BD707-D9CF-40AE-B4C6-C98DA3205C09}" type="datetimeFigureOut">
               <a:rPr lang="en-US" smtClean="0"/>
               <a:pPr/>
-              <a:t>1/27/2025</a:t>
+              <a:t>1/29/25</a:t>
             </a:fld>
             <a:endParaRPr lang="en-US"/>
           </a:p>
@@ -1086,7 +1086,7 @@
             <a:fld id="{1D8BD707-D9CF-40AE-B4C6-C98DA3205C09}" type="datetimeFigureOut">
               <a:rPr lang="en-US" smtClean="0"/>
               <a:pPr/>
-              <a:t>1/27/2025</a:t>
+              <a:t>1/29/25</a:t>
             </a:fld>
             <a:endParaRPr lang="en-US"/>
           </a:p>
@@ -1371,7 +1371,7 @@
             <a:fld id="{1D8BD707-D9CF-40AE-B4C6-C98DA3205C09}" type="datetimeFigureOut">
               <a:rPr lang="en-US" smtClean="0"/>
               <a:pPr/>
-              <a:t>1/27/2025</a:t>
+              <a:t>1/29/25</a:t>
             </a:fld>
             <a:endParaRPr lang="en-US"/>
           </a:p>
@@ -1790,7 +1790,7 @@
             <a:fld id="{1D8BD707-D9CF-40AE-B4C6-C98DA3205C09}" type="datetimeFigureOut">
               <a:rPr lang="en-US" smtClean="0"/>
               <a:pPr/>
-              <a:t>1/27/2025</a:t>
+              <a:t>1/29/25</a:t>
             </a:fld>
             <a:endParaRPr lang="en-US"/>
           </a:p>
@@ -1905,7 +1905,7 @@
             <a:fld id="{1D8BD707-D9CF-40AE-B4C6-C98DA3205C09}" type="datetimeFigureOut">
               <a:rPr lang="en-US" smtClean="0"/>
               <a:pPr/>
-              <a:t>1/27/2025</a:t>
+              <a:t>1/29/25</a:t>
             </a:fld>
             <a:endParaRPr lang="en-US"/>
           </a:p>
@@ -1997,7 +1997,7 @@
             <a:fld id="{1D8BD707-D9CF-40AE-B4C6-C98DA3205C09}" type="datetimeFigureOut">
               <a:rPr lang="en-US" smtClean="0"/>
               <a:pPr/>
-              <a:t>1/27/2025</a:t>
+              <a:t>1/29/25</a:t>
             </a:fld>
             <a:endParaRPr lang="en-US"/>
           </a:p>
@@ -2271,7 +2271,7 @@
             <a:fld id="{1D8BD707-D9CF-40AE-B4C6-C98DA3205C09}" type="datetimeFigureOut">
               <a:rPr lang="en-US" smtClean="0"/>
               <a:pPr/>
-              <a:t>1/27/2025</a:t>
+              <a:t>1/29/25</a:t>
             </a:fld>
             <a:endParaRPr lang="en-US"/>
           </a:p>
@@ -2521,7 +2521,7 @@
             <a:fld id="{1D8BD707-D9CF-40AE-B4C6-C98DA3205C09}" type="datetimeFigureOut">
               <a:rPr lang="en-US" smtClean="0"/>
               <a:pPr/>
-              <a:t>1/27/2025</a:t>
+              <a:t>1/29/25</a:t>
             </a:fld>
             <a:endParaRPr lang="en-US"/>
           </a:p>
@@ -2731,7 +2731,7 @@
             <a:fld id="{1D8BD707-D9CF-40AE-B4C6-C98DA3205C09}" type="datetimeFigureOut">
               <a:rPr lang="en-US" smtClean="0"/>
               <a:pPr/>
-              <a:t>1/27/2025</a:t>
+              <a:t>1/29/25</a:t>
             </a:fld>
             <a:endParaRPr lang="en-US"/>
           </a:p>
@@ -3256,7 +3256,7 @@
               <a:t> </a:t>
             </a:r>
             <a:r>
-              <a:rPr lang="en-US" sz="5400" b="1" i="1" dirty="0" smtClean="0">
+              <a:rPr lang="en-US" sz="5400" b="1" i="1" smtClean="0">
                 <a:solidFill>
                   <a:srgbClr val="0F4662"/>
                 </a:solidFill>
@@ -3268,7 +3268,7 @@
               <a:t>and </a:t>
             </a:r>
             <a:r>
-              <a:rPr lang="en-US" sz="5400" b="1" i="1" dirty="0" err="1" smtClean="0">
+              <a:rPr lang="en-US" sz="5400" b="1" i="1" smtClean="0">
                 <a:solidFill>
                   <a:srgbClr val="0F4662"/>
                 </a:solidFill>
@@ -3277,10 +3277,10 @@
                 <a:cs typeface="Cormorant Garamond Bold Italics"/>
                 <a:sym typeface="Cormorant Garamond Bold Italics"/>
               </a:rPr>
-              <a:t>Mansoor</a:t>
-            </a:r>
-            <a:r>
-              <a:rPr lang="en-US" sz="5400" b="1" i="1" smtClean="0">
+              <a:t>Sir Mansoor</a:t>
+            </a:r>
+            <a:r>
+              <a:rPr lang="en-US" sz="5400" b="1" i="1" dirty="0" smtClean="0">
                 <a:solidFill>
                   <a:srgbClr val="0F4662"/>
                 </a:solidFill>
@@ -3289,7 +3289,19 @@
                 <a:cs typeface="Cormorant Garamond Bold Italics"/>
                 <a:sym typeface="Cormorant Garamond Bold Italics"/>
               </a:rPr>
-              <a:t> Ahmed.</a:t>
+              <a:t> </a:t>
+            </a:r>
+            <a:r>
+              <a:rPr lang="en-US" sz="5400" b="1" i="1" dirty="0" smtClean="0">
+                <a:solidFill>
+                  <a:srgbClr val="0F4662"/>
+                </a:solidFill>
+                <a:latin typeface="Cormorant Garamond Bold Italics"/>
+                <a:ea typeface="Cormorant Garamond Bold Italics"/>
+                <a:cs typeface="Cormorant Garamond Bold Italics"/>
+                <a:sym typeface="Cormorant Garamond Bold Italics"/>
+              </a:rPr>
+              <a:t>Ahmed.</a:t>
             </a:r>
             <a:endParaRPr lang="en-US" sz="3200" b="1" i="1" dirty="0">
               <a:solidFill>
@@ -3428,7 +3440,7 @@
             <a:blip r:embed="rId2">
               <a:extLst>
                 <a:ext uri="{96DAC541-7B7A-43D3-8B79-37D633B846F1}">
-                  <asvg:svgBlip xmlns="" xmlns:asvg="http://schemas.microsoft.com/office/drawing/2016/SVG/main" r:embed="rId3"/>
+                  <asvg:svgBlip xmlns:asvg="http://schemas.microsoft.com/office/drawing/2016/SVG/main" xmlns="" r:embed="rId3"/>
                 </a:ext>
               </a:extLst>
             </a:blip>
@@ -3480,7 +3492,7 @@
             <a:blip r:embed="rId2">
               <a:extLst>
                 <a:ext uri="{96DAC541-7B7A-43D3-8B79-37D633B846F1}">
-                  <asvg:svgBlip xmlns="" xmlns:asvg="http://schemas.microsoft.com/office/drawing/2016/SVG/main" r:embed="rId3"/>
+                  <asvg:svgBlip xmlns:asvg="http://schemas.microsoft.com/office/drawing/2016/SVG/main" xmlns="" r:embed="rId3"/>
                 </a:ext>
               </a:extLst>
             </a:blip>
@@ -3781,7 +3793,7 @@
             <a:blip r:embed="rId2">
               <a:extLst>
                 <a:ext uri="{96DAC541-7B7A-43D3-8B79-37D633B846F1}">
-                  <asvg:svgBlip xmlns="" xmlns:asvg="http://schemas.microsoft.com/office/drawing/2016/SVG/main" r:embed="rId3"/>
+                  <asvg:svgBlip xmlns:asvg="http://schemas.microsoft.com/office/drawing/2016/SVG/main" xmlns="" r:embed="rId3"/>
                 </a:ext>
               </a:extLst>
             </a:blip>
@@ -3877,7 +3889,7 @@
             <a:blip r:embed="rId2">
               <a:extLst>
                 <a:ext uri="{96DAC541-7B7A-43D3-8B79-37D633B846F1}">
-                  <asvg:svgBlip xmlns="" xmlns:asvg="http://schemas.microsoft.com/office/drawing/2016/SVG/main" r:embed="rId3"/>
+                  <asvg:svgBlip xmlns:asvg="http://schemas.microsoft.com/office/drawing/2016/SVG/main" xmlns="" r:embed="rId3"/>
                 </a:ext>
               </a:extLst>
             </a:blip>
@@ -4124,7 +4136,7 @@
             <a:blip r:embed="rId2">
               <a:extLst>
                 <a:ext uri="{96DAC541-7B7A-43D3-8B79-37D633B846F1}">
-                  <asvg:svgBlip xmlns="" xmlns:asvg="http://schemas.microsoft.com/office/drawing/2016/SVG/main" r:embed="rId3"/>
+                  <asvg:svgBlip xmlns:asvg="http://schemas.microsoft.com/office/drawing/2016/SVG/main" xmlns="" r:embed="rId3"/>
                 </a:ext>
               </a:extLst>
             </a:blip>
@@ -4236,7 +4248,7 @@
             <a:blip r:embed="rId2">
               <a:extLst>
                 <a:ext uri="{96DAC541-7B7A-43D3-8B79-37D633B846F1}">
-                  <asvg:svgBlip xmlns="" xmlns:asvg="http://schemas.microsoft.com/office/drawing/2016/SVG/main" r:embed="rId3"/>
+                  <asvg:svgBlip xmlns:asvg="http://schemas.microsoft.com/office/drawing/2016/SVG/main" xmlns="" r:embed="rId3"/>
                 </a:ext>
               </a:extLst>
             </a:blip>
@@ -4288,7 +4300,7 @@
         <p:spPr>
           <a:xfrm>
             <a:off x="3338606" y="1980199"/>
-            <a:ext cx="11476514" cy="6486275"/>
+            <a:ext cx="11476514" cy="7232749"/>
           </a:xfrm>
           <a:prstGeom prst="rect">
             <a:avLst/>
@@ -4306,7 +4318,7 @@
               </a:lnSpc>
             </a:pPr>
             <a:r>
-              <a:rPr lang="en-US" sz="2765">
+              <a:rPr lang="en-US" sz="2765" dirty="0">
                 <a:solidFill>
                   <a:srgbClr val="0F4662"/>
                 </a:solidFill>
@@ -4325,7 +4337,7 @@
               </a:lnSpc>
             </a:pPr>
             <a:r>
-              <a:rPr lang="en-US" sz="2765" b="1">
+              <a:rPr lang="en-US" sz="2765" b="1" dirty="0">
                 <a:solidFill>
                   <a:srgbClr val="0F4662"/>
                 </a:solidFill>
@@ -4334,7 +4346,19 @@
                 <a:cs typeface="Quicksand Bold"/>
                 <a:sym typeface="Quicksand Bold"/>
               </a:rPr>
-              <a:t>Key Features Implemented:</a:t>
+              <a:t>Key Features Implemented</a:t>
+            </a:r>
+            <a:r>
+              <a:rPr lang="en-US" sz="2765" b="1" dirty="0" smtClean="0">
+                <a:solidFill>
+                  <a:srgbClr val="0F4662"/>
+                </a:solidFill>
+                <a:latin typeface="Quicksand Bold"/>
+                <a:ea typeface="Quicksand Bold"/>
+                <a:cs typeface="Quicksand Bold"/>
+                <a:sym typeface="Quicksand Bold"/>
+              </a:rPr>
+              <a:t>:</a:t>
             </a:r>
           </a:p>
           <a:p>
@@ -4344,7 +4368,7 @@
               </a:lnSpc>
             </a:pPr>
             <a:r>
-              <a:rPr lang="en-US" sz="2765">
+              <a:rPr lang="en-US" sz="2765" dirty="0" smtClean="0">
                 <a:solidFill>
                   <a:srgbClr val="0F4662"/>
                 </a:solidFill>
@@ -4353,17 +4377,10 @@
                 <a:cs typeface="Quicksand"/>
                 <a:sym typeface="Quicksand"/>
               </a:rPr>
-              <a:t>1. Add new student records.</a:t>
-            </a:r>
-          </a:p>
-          <a:p>
-            <a:pPr algn="ctr">
-              <a:lnSpc>
-                <a:spcPts val="4700"/>
-              </a:lnSpc>
-            </a:pPr>
-            <a:r>
-              <a:rPr lang="en-US" sz="2765">
+              <a:t>1. User Authentication (signup &amp; login)</a:t>
+            </a:r>
+            <a:r>
+              <a:rPr lang="en-US" sz="2765" dirty="0">
                 <a:solidFill>
                   <a:srgbClr val="0F4662"/>
                 </a:solidFill>
@@ -4372,17 +4389,10 @@
                 <a:cs typeface="Quicksand"/>
                 <a:sym typeface="Quicksand"/>
               </a:rPr>
-              <a:t>2. Search for students by name, roll number, or CGPA.</a:t>
-            </a:r>
-          </a:p>
-          <a:p>
-            <a:pPr algn="ctr">
-              <a:lnSpc>
-                <a:spcPts val="4700"/>
-              </a:lnSpc>
-            </a:pPr>
-            <a:r>
-              <a:rPr lang="en-US" sz="2765">
+              <a:t/>
+            </a:r>
+            <a:br>
+              <a:rPr lang="en-US" sz="2765" dirty="0">
                 <a:solidFill>
                   <a:srgbClr val="0F4662"/>
                 </a:solidFill>
@@ -4391,17 +4401,9 @@
                 <a:cs typeface="Quicksand"/>
                 <a:sym typeface="Quicksand"/>
               </a:rPr>
-              <a:t>3. Update and remove student records.</a:t>
-            </a:r>
-          </a:p>
-          <a:p>
-            <a:pPr algn="ctr">
-              <a:lnSpc>
-                <a:spcPts val="4700"/>
-              </a:lnSpc>
-            </a:pPr>
-            <a:r>
-              <a:rPr lang="en-US" sz="2765">
+            </a:br>
+            <a:r>
+              <a:rPr lang="en-US" sz="2765" dirty="0">
                 <a:solidFill>
                   <a:srgbClr val="0F4662"/>
                 </a:solidFill>
@@ -4410,16 +4412,9 @@
                 <a:cs typeface="Quicksand"/>
                 <a:sym typeface="Quicksand"/>
               </a:rPr>
-              <a:t>4. Display all students in a formatted table.</a:t>
-            </a:r>
-          </a:p>
-          <a:p>
-            <a:pPr algn="ctr">
-              <a:lnSpc>
-                <a:spcPts val="4700"/>
-              </a:lnSpc>
-            </a:pPr>
-            <a:endParaRPr lang="en-US" sz="2765">
+              <a:t>2. Add new student records</a:t>
+            </a:r>
+            <a:endParaRPr lang="en-US" sz="2765" dirty="0">
               <a:solidFill>
                 <a:srgbClr val="0F4662"/>
               </a:solidFill>
@@ -4436,16 +4431,28 @@
               </a:lnSpc>
             </a:pPr>
             <a:r>
-              <a:rPr lang="en-US" sz="2765" b="1">
+              <a:rPr lang="en-US" sz="2765" dirty="0" smtClean="0">
                 <a:solidFill>
                   <a:srgbClr val="0F4662"/>
                 </a:solidFill>
-                <a:latin typeface="Quicksand Bold"/>
-                <a:ea typeface="Quicksand Bold"/>
-                <a:cs typeface="Quicksand Bold"/>
-                <a:sym typeface="Quicksand Bold"/>
+                <a:latin typeface="Quicksand"/>
+                <a:ea typeface="Quicksand"/>
+                <a:cs typeface="Quicksand"/>
+                <a:sym typeface="Quicksand"/>
               </a:rPr>
-              <a:t>File Handling:</a:t>
+              <a:t>3. Search </a:t>
+            </a:r>
+            <a:r>
+              <a:rPr lang="en-US" sz="2765" dirty="0">
+                <a:solidFill>
+                  <a:srgbClr val="0F4662"/>
+                </a:solidFill>
+                <a:latin typeface="Quicksand"/>
+                <a:ea typeface="Quicksand"/>
+                <a:cs typeface="Quicksand"/>
+                <a:sym typeface="Quicksand"/>
+              </a:rPr>
+              <a:t>for students by name, roll number, or CGPA.</a:t>
             </a:r>
           </a:p>
           <a:p>
@@ -4455,7 +4462,7 @@
               </a:lnSpc>
             </a:pPr>
             <a:r>
-              <a:rPr lang="en-US" sz="2765">
+              <a:rPr lang="en-US" sz="2765" dirty="0" smtClean="0">
                 <a:solidFill>
                   <a:srgbClr val="0F4662"/>
                 </a:solidFill>
@@ -4464,7 +4471,19 @@
                 <a:cs typeface="Quicksand"/>
                 <a:sym typeface="Quicksand"/>
               </a:rPr>
-              <a:t>Data is stored and retrieved from a text file ("Student.txt").</a:t>
+              <a:t>4. Update </a:t>
+            </a:r>
+            <a:r>
+              <a:rPr lang="en-US" sz="2765" dirty="0">
+                <a:solidFill>
+                  <a:srgbClr val="0F4662"/>
+                </a:solidFill>
+                <a:latin typeface="Quicksand"/>
+                <a:ea typeface="Quicksand"/>
+                <a:cs typeface="Quicksand"/>
+                <a:sym typeface="Quicksand"/>
+              </a:rPr>
+              <a:t>and remove student records.</a:t>
             </a:r>
           </a:p>
           <a:p>
@@ -4473,7 +4492,38 @@
                 <a:spcPts val="4700"/>
               </a:lnSpc>
             </a:pPr>
-            <a:endParaRPr lang="en-US" sz="2765">
+            <a:r>
+              <a:rPr lang="en-US" sz="2765" dirty="0" smtClean="0">
+                <a:solidFill>
+                  <a:srgbClr val="0F4662"/>
+                </a:solidFill>
+                <a:latin typeface="Quicksand"/>
+                <a:ea typeface="Quicksand"/>
+                <a:cs typeface="Quicksand"/>
+                <a:sym typeface="Quicksand"/>
+              </a:rPr>
+              <a:t>5. Display </a:t>
+            </a:r>
+            <a:r>
+              <a:rPr lang="en-US" sz="2765" dirty="0">
+                <a:solidFill>
+                  <a:srgbClr val="0F4662"/>
+                </a:solidFill>
+                <a:latin typeface="Quicksand"/>
+                <a:ea typeface="Quicksand"/>
+                <a:cs typeface="Quicksand"/>
+                <a:sym typeface="Quicksand"/>
+              </a:rPr>
+              <a:t>all students in a formatted table.</a:t>
+            </a:r>
+          </a:p>
+          <a:p>
+            <a:pPr algn="ctr">
+              <a:lnSpc>
+                <a:spcPts val="4700"/>
+              </a:lnSpc>
+            </a:pPr>
+            <a:endParaRPr lang="en-US" sz="2765" dirty="0">
               <a:solidFill>
                 <a:srgbClr val="0F4662"/>
               </a:solidFill>
@@ -4484,12 +4534,66 @@
             </a:endParaRPr>
           </a:p>
           <a:p>
+            <a:pPr algn="ctr">
+              <a:lnSpc>
+                <a:spcPts val="4700"/>
+              </a:lnSpc>
+            </a:pPr>
+            <a:r>
+              <a:rPr lang="en-US" sz="2765" b="1" dirty="0">
+                <a:solidFill>
+                  <a:srgbClr val="0F4662"/>
+                </a:solidFill>
+                <a:latin typeface="Quicksand Bold"/>
+                <a:ea typeface="Quicksand Bold"/>
+                <a:cs typeface="Quicksand Bold"/>
+                <a:sym typeface="Quicksand Bold"/>
+              </a:rPr>
+              <a:t>File Handling:</a:t>
+            </a:r>
+          </a:p>
+          <a:p>
+            <a:pPr algn="ctr">
+              <a:lnSpc>
+                <a:spcPts val="4700"/>
+              </a:lnSpc>
+            </a:pPr>
+            <a:r>
+              <a:rPr lang="en-US" sz="2765" dirty="0">
+                <a:solidFill>
+                  <a:srgbClr val="0F4662"/>
+                </a:solidFill>
+                <a:latin typeface="Quicksand"/>
+                <a:ea typeface="Quicksand"/>
+                <a:cs typeface="Quicksand"/>
+                <a:sym typeface="Quicksand"/>
+              </a:rPr>
+              <a:t>Data is stored and retrieved from a text file ("Student.txt").</a:t>
+            </a:r>
+          </a:p>
+          <a:p>
+            <a:pPr algn="ctr">
+              <a:lnSpc>
+                <a:spcPts val="4700"/>
+              </a:lnSpc>
+            </a:pPr>
+            <a:endParaRPr lang="en-US" sz="2765" dirty="0">
+              <a:solidFill>
+                <a:srgbClr val="0F4662"/>
+              </a:solidFill>
+              <a:latin typeface="Quicksand"/>
+              <a:ea typeface="Quicksand"/>
+              <a:cs typeface="Quicksand"/>
+              <a:sym typeface="Quicksand"/>
+            </a:endParaRPr>
+          </a:p>
+          <a:p>
             <a:pPr marL="0" lvl="0" indent="0" algn="ctr">
               <a:lnSpc>
                 <a:spcPts val="4700"/>
               </a:lnSpc>
             </a:pPr>
-            <a:endParaRPr lang="en-US" sz="2765">
+            <a:endParaRPr lang="en-US" sz="2765" dirty="0">
               <a:solidFill>
                 <a:srgbClr val="0F4662"/>
               </a:solidFill>
@@ -4591,7 +4695,7 @@
             <a:blip r:embed="rId2">
               <a:extLst>
                 <a:ext uri="{96DAC541-7B7A-43D3-8B79-37D633B846F1}">
-                  <asvg:svgBlip xmlns="" xmlns:asvg="http://schemas.microsoft.com/office/drawing/2016/SVG/main" r:embed="rId3"/>
+                  <asvg:svgBlip xmlns:asvg="http://schemas.microsoft.com/office/drawing/2016/SVG/main" xmlns="" r:embed="rId3"/>
                 </a:ext>
               </a:extLst>
             </a:blip>
@@ -4687,7 +4791,7 @@
             <a:blip r:embed="rId2">
               <a:extLst>
                 <a:ext uri="{96DAC541-7B7A-43D3-8B79-37D633B846F1}">
-                  <asvg:svgBlip xmlns="" xmlns:asvg="http://schemas.microsoft.com/office/drawing/2016/SVG/main" r:embed="rId3"/>
+                  <asvg:svgBlip xmlns:asvg="http://schemas.microsoft.com/office/drawing/2016/SVG/main" xmlns="" r:embed="rId3"/>
                 </a:ext>
               </a:extLst>
             </a:blip>
@@ -4934,7 +5038,7 @@
             <a:blip r:embed="rId2">
               <a:extLst>
                 <a:ext uri="{96DAC541-7B7A-43D3-8B79-37D633B846F1}">
-                  <asvg:svgBlip xmlns="" xmlns:asvg="http://schemas.microsoft.com/office/drawing/2016/SVG/main" r:embed="rId3"/>
+                  <asvg:svgBlip xmlns:asvg="http://schemas.microsoft.com/office/drawing/2016/SVG/main" xmlns="" r:embed="rId3"/>
                 </a:ext>
               </a:extLst>
             </a:blip>
@@ -5046,7 +5150,7 @@
             <a:blip r:embed="rId2">
               <a:extLst>
                 <a:ext uri="{96DAC541-7B7A-43D3-8B79-37D633B846F1}">
-                  <asvg:svgBlip xmlns="" xmlns:asvg="http://schemas.microsoft.com/office/drawing/2016/SVG/main" r:embed="rId3"/>
+                  <asvg:svgBlip xmlns:asvg="http://schemas.microsoft.com/office/drawing/2016/SVG/main" xmlns="" r:embed="rId3"/>
                 </a:ext>
               </a:extLst>
             </a:blip>
@@ -5382,7 +5486,7 @@
             <a:blip r:embed="rId2">
               <a:extLst>
                 <a:ext uri="{96DAC541-7B7A-43D3-8B79-37D633B846F1}">
-                  <asvg:svgBlip xmlns="" xmlns:asvg="http://schemas.microsoft.com/office/drawing/2016/SVG/main" r:embed="rId3"/>
+                  <asvg:svgBlip xmlns:asvg="http://schemas.microsoft.com/office/drawing/2016/SVG/main" xmlns="" r:embed="rId3"/>
                 </a:ext>
               </a:extLst>
             </a:blip>
@@ -5510,7 +5614,7 @@
             <a:blip r:embed="rId2">
               <a:extLst>
                 <a:ext uri="{96DAC541-7B7A-43D3-8B79-37D633B846F1}">
-                  <asvg:svgBlip xmlns="" xmlns:asvg="http://schemas.microsoft.com/office/drawing/2016/SVG/main" r:embed="rId3"/>
+                  <asvg:svgBlip xmlns:asvg="http://schemas.microsoft.com/office/drawing/2016/SVG/main" xmlns="" r:embed="rId3"/>
                 </a:ext>
               </a:extLst>
             </a:blip>
@@ -5814,7 +5918,7 @@
             <a:blip r:embed="rId2">
               <a:extLst>
                 <a:ext uri="{96DAC541-7B7A-43D3-8B79-37D633B846F1}">
-                  <asvg:svgBlip xmlns="" xmlns:asvg="http://schemas.microsoft.com/office/drawing/2016/SVG/main" r:embed="rId3"/>
+                  <asvg:svgBlip xmlns:asvg="http://schemas.microsoft.com/office/drawing/2016/SVG/main" xmlns="" r:embed="rId3"/>
                 </a:ext>
               </a:extLst>
             </a:blip>
@@ -5942,7 +6046,7 @@
             <a:blip r:embed="rId2">
               <a:extLst>
                 <a:ext uri="{96DAC541-7B7A-43D3-8B79-37D633B846F1}">
-                  <asvg:svgBlip xmlns="" xmlns:asvg="http://schemas.microsoft.com/office/drawing/2016/SVG/main" r:embed="rId3"/>
+                  <asvg:svgBlip xmlns:asvg="http://schemas.microsoft.com/office/drawing/2016/SVG/main" xmlns="" r:embed="rId3"/>
                 </a:ext>
               </a:extLst>
             </a:blip>

</xml_diff>